<commit_message>
Map and collections class code changes
</commit_message>
<xml_diff>
--- a/Collection Framework/Presentation/Collection framework.pptx
+++ b/Collection Framework/Presentation/Collection framework.pptx
@@ -330,7 +330,7 @@
               <a:pPr>
                 <a:defRPr/>
               </a:pPr>
-              <a:t>10/12/22</a:t>
+              <a:t>10/17/22</a:t>
             </a:fld>
             <a:endParaRPr lang="en-US" altLang="en-US"/>
           </a:p>
@@ -25352,8 +25352,8 @@
         </p:blipFill>
         <p:spPr>
           <a:xfrm>
-            <a:off x="1600200" y="2000250"/>
-            <a:ext cx="5124450" cy="4745038"/>
+            <a:off x="1118555" y="1705820"/>
+            <a:ext cx="6939595" cy="5039468"/>
           </a:xfrm>
         </p:spPr>
       </p:pic>
@@ -25476,7 +25476,7 @@
         </p:nvGraphicFramePr>
         <p:xfrm>
           <a:off x="304800" y="2209800"/>
-          <a:ext cx="8534400" cy="3932238"/>
+          <a:ext cx="8534400" cy="3932237"/>
         </p:xfrm>
         <a:graphic>
           <a:graphicData uri="http://schemas.openxmlformats.org/drawingml/2006/table">

</xml_diff>